<commit_message>
Course Day 10 PPT updated
</commit_message>
<xml_diff>
--- a/Course Day 10/Webmonk Course (day - 10).pptx
+++ b/Course Day 10/Webmonk Course (day - 10).pptx
@@ -22,15 +22,14 @@
     <p:sldId id="266" r:id="rId16"/>
     <p:sldId id="267" r:id="rId17"/>
     <p:sldId id="268" r:id="rId18"/>
-    <p:sldId id="269" r:id="rId19"/>
   </p:sldIdLst>
   <p:sldSz cy="6858000" cx="12192000"/>
   <p:notesSz cx="6858000" cy="9144000"/>
   <p:embeddedFontLst>
     <p:embeddedFont>
       <p:font typeface="Gill Sans"/>
-      <p:regular r:id="rId20"/>
-      <p:bold r:id="rId21"/>
+      <p:regular r:id="rId19"/>
+      <p:bold r:id="rId20"/>
     </p:embeddedFont>
   </p:embeddedFontLst>
   <p:defaultTextStyle>
@@ -264,7 +263,7 @@
   </p:defaultTextStyle>
   <p:extLst>
     <p:ext uri="http://customooxmlschemas.google.com/">
-      <go:slidesCustomData xmlns:go="http://customooxmlschemas.google.com/" r:id="rId22" roundtripDataSignature="AMtx7mg29jBAGEXpCXMeCM6M657hxkzw6A=="/>
+      <go:slidesCustomData xmlns:go="http://customooxmlschemas.google.com/" r:id="rId21" roundtripDataSignature="AMtx7mimBkswDgFCdxnqqz8WMuGrftJ8qg=="/>
     </p:ext>
   </p:extLst>
 </p:presentation>
@@ -2317,171 +2316,6 @@
               </a:buClr>
               <a:buSzPts val="1200"/>
               <a:buFont typeface="Arial"/>
-              <a:buNone/>
-            </a:pPr>
-            <a:fld id="{00000000-1234-1234-1234-123412341234}" type="slidenum">
-              <a:rPr lang="en-IN"/>
-              <a:t>‹#›</a:t>
-            </a:fld>
-            <a:endParaRPr/>
-          </a:p>
-        </p:txBody>
-      </p:sp>
-    </p:spTree>
-  </p:cSld>
-  <p:clrMapOvr>
-    <a:masterClrMapping/>
-  </p:clrMapOvr>
-</p:notes>
-</file>
-
-<file path=ppt/notesSlides/notesSlide14.xml><?xml version="1.0" encoding="utf-8"?>
-<p:notes xmlns:a="http://schemas.openxmlformats.org/drawingml/2006/main" xmlns:r="http://schemas.openxmlformats.org/officeDocument/2006/relationships" xmlns:mc="http://schemas.openxmlformats.org/markup-compatibility/2006" xmlns:mv="urn:schemas-microsoft-com:mac:vml" xmlns:p="http://schemas.openxmlformats.org/presentationml/2006/main" xmlns:c="http://schemas.openxmlformats.org/drawingml/2006/chart" xmlns:dgm="http://schemas.openxmlformats.org/drawingml/2006/diagram" xmlns:o="urn:schemas-microsoft-com:office:office" xmlns:v="urn:schemas-microsoft-com:vml" xmlns:pvml="urn:schemas-microsoft-com:office:powerpoint" xmlns:com="http://schemas.openxmlformats.org/drawingml/2006/compatibility" xmlns:p14="http://schemas.microsoft.com/office/powerpoint/2010/main" xmlns:p15="http://schemas.microsoft.com/office/powerpoint/2012/main" xmlns:ahyp="http://schemas.microsoft.com/office/drawing/2018/hyperlinkcolor" showMasterPhAnim="0" showMasterSp="0">
-  <p:cSld>
-    <p:spTree>
-      <p:nvGrpSpPr>
-        <p:cNvPr id="199" name="Shape 199"/>
-        <p:cNvGrpSpPr/>
-        <p:nvPr/>
-      </p:nvGrpSpPr>
-      <p:grpSpPr>
-        <a:xfrm>
-          <a:off x="0" y="0"/>
-          <a:ext cx="0" cy="0"/>
-          <a:chOff x="0" y="0"/>
-          <a:chExt cx="0" cy="0"/>
-        </a:xfrm>
-      </p:grpSpPr>
-      <p:sp>
-        <p:nvSpPr>
-          <p:cNvPr id="200" name="Google Shape;200;ga8aa0623b4_3_51:notes"/>
-          <p:cNvSpPr/>
-          <p:nvPr>
-            <p:ph idx="2" type="sldImg"/>
-          </p:nvPr>
-        </p:nvSpPr>
-        <p:spPr>
-          <a:xfrm>
-            <a:off x="685800" y="1143000"/>
-            <a:ext cx="5486400" cy="3086100"/>
-          </a:xfrm>
-          <a:custGeom>
-            <a:rect b="b" l="l" r="r" t="t"/>
-            <a:pathLst>
-              <a:path extrusionOk="0" h="120000" w="120000">
-                <a:moveTo>
-                  <a:pt x="0" y="0"/>
-                </a:moveTo>
-                <a:lnTo>
-                  <a:pt x="120000" y="0"/>
-                </a:lnTo>
-                <a:lnTo>
-                  <a:pt x="120000" y="120000"/>
-                </a:lnTo>
-                <a:lnTo>
-                  <a:pt x="0" y="120000"/>
-                </a:lnTo>
-                <a:close/>
-              </a:path>
-            </a:pathLst>
-          </a:custGeom>
-          <a:noFill/>
-          <a:ln cap="flat" cmpd="sng" w="12700">
-            <a:solidFill>
-              <a:srgbClr val="000000"/>
-            </a:solidFill>
-            <a:prstDash val="solid"/>
-            <a:round/>
-            <a:headEnd len="sm" w="sm" type="none"/>
-            <a:tailEnd len="sm" w="sm" type="none"/>
-          </a:ln>
-        </p:spPr>
-      </p:sp>
-      <p:sp>
-        <p:nvSpPr>
-          <p:cNvPr id="201" name="Google Shape;201;ga8aa0623b4_3_51:notes"/>
-          <p:cNvSpPr txBox="1"/>
-          <p:nvPr>
-            <p:ph idx="1" type="body"/>
-          </p:nvPr>
-        </p:nvSpPr>
-        <p:spPr>
-          <a:xfrm>
-            <a:off x="685800" y="4400550"/>
-            <a:ext cx="5486400" cy="3600600"/>
-          </a:xfrm>
-          <a:prstGeom prst="rect">
-            <a:avLst/>
-          </a:prstGeom>
-          <a:noFill/>
-          <a:ln>
-            <a:noFill/>
-          </a:ln>
-        </p:spPr>
-        <p:txBody>
-          <a:bodyPr anchorCtr="0" anchor="t" bIns="45700" lIns="91425" spcFirstLastPara="1" rIns="91425" wrap="square" tIns="45700">
-            <a:noAutofit/>
-          </a:bodyPr>
-          <a:lstStyle/>
-          <a:p>
-            <a:pPr indent="0" lvl="0" marL="0" rtl="0" algn="l">
-              <a:lnSpc>
-                <a:spcPct val="100000"/>
-              </a:lnSpc>
-              <a:spcBef>
-                <a:spcPts val="0"/>
-              </a:spcBef>
-              <a:spcAft>
-                <a:spcPts val="0"/>
-              </a:spcAft>
-              <a:buSzPts val="1400"/>
-              <a:buNone/>
-            </a:pPr>
-            <a:r>
-              <a:t/>
-            </a:r>
-            <a:endParaRPr/>
-          </a:p>
-        </p:txBody>
-      </p:sp>
-      <p:sp>
-        <p:nvSpPr>
-          <p:cNvPr id="202" name="Google Shape;202;ga8aa0623b4_3_51:notes"/>
-          <p:cNvSpPr txBox="1"/>
-          <p:nvPr>
-            <p:ph idx="12" type="sldNum"/>
-          </p:nvPr>
-        </p:nvSpPr>
-        <p:spPr>
-          <a:xfrm>
-            <a:off x="3884613" y="8685213"/>
-            <a:ext cx="2971800" cy="458700"/>
-          </a:xfrm>
-          <a:prstGeom prst="rect">
-            <a:avLst/>
-          </a:prstGeom>
-          <a:noFill/>
-          <a:ln>
-            <a:noFill/>
-          </a:ln>
-        </p:spPr>
-        <p:txBody>
-          <a:bodyPr anchorCtr="0" anchor="b" bIns="45700" lIns="91425" spcFirstLastPara="1" rIns="91425" wrap="square" tIns="45700">
-            <a:noAutofit/>
-          </a:bodyPr>
-          <a:lstStyle/>
-          <a:p>
-            <a:pPr indent="0" lvl="0" marL="0" rtl="0" algn="r">
-              <a:lnSpc>
-                <a:spcPct val="100000"/>
-              </a:lnSpc>
-              <a:spcBef>
-                <a:spcPts val="0"/>
-              </a:spcBef>
-              <a:spcAft>
-                <a:spcPts val="0"/>
-              </a:spcAft>
-              <a:buSzPts val="1400"/>
               <a:buNone/>
             </a:pPr>
             <a:fld id="{00000000-1234-1234-1234-123412341234}" type="slidenum">
@@ -20920,6 +20754,26 @@
             </a:r>
             <a:endParaRPr/>
           </a:p>
+          <a:p>
+            <a:pPr indent="0" lvl="0" marL="0" rtl="0" algn="ctr">
+              <a:lnSpc>
+                <a:spcPct val="90000"/>
+              </a:lnSpc>
+              <a:spcBef>
+                <a:spcPts val="1000"/>
+              </a:spcBef>
+              <a:spcAft>
+                <a:spcPts val="0"/>
+              </a:spcAft>
+              <a:buSzPts val="2000"/>
+              <a:buNone/>
+            </a:pPr>
+            <a:r>
+              <a:rPr lang="en-IN"/>
+              <a:t>* MongoDB CRUD</a:t>
+            </a:r>
+            <a:endParaRPr/>
+          </a:p>
         </p:txBody>
       </p:sp>
       <p:sp>
@@ -21736,406 +21590,6 @@
           </a:ln>
         </p:spPr>
       </p:pic>
-    </p:spTree>
-  </p:cSld>
-  <p:clrMapOvr>
-    <a:masterClrMapping/>
-  </p:clrMapOvr>
-</p:sld>
-</file>
-
-<file path=ppt/slides/slide14.xml><?xml version="1.0" encoding="utf-8"?>
-<p:sld xmlns:a="http://schemas.openxmlformats.org/drawingml/2006/main" xmlns:r="http://schemas.openxmlformats.org/officeDocument/2006/relationships" xmlns:mc="http://schemas.openxmlformats.org/markup-compatibility/2006" xmlns:mv="urn:schemas-microsoft-com:mac:vml" xmlns:p="http://schemas.openxmlformats.org/presentationml/2006/main" xmlns:c="http://schemas.openxmlformats.org/drawingml/2006/chart" xmlns:dgm="http://schemas.openxmlformats.org/drawingml/2006/diagram" xmlns:o="urn:schemas-microsoft-com:office:office" xmlns:v="urn:schemas-microsoft-com:vml" xmlns:pvml="urn:schemas-microsoft-com:office:powerpoint" xmlns:com="http://schemas.openxmlformats.org/drawingml/2006/compatibility" xmlns:p14="http://schemas.microsoft.com/office/powerpoint/2010/main" xmlns:p15="http://schemas.microsoft.com/office/powerpoint/2012/main" xmlns:ahyp="http://schemas.microsoft.com/office/drawing/2018/hyperlinkcolor">
-  <p:cSld>
-    <p:spTree>
-      <p:nvGrpSpPr>
-        <p:cNvPr id="203" name="Shape 203"/>
-        <p:cNvGrpSpPr/>
-        <p:nvPr/>
-      </p:nvGrpSpPr>
-      <p:grpSpPr>
-        <a:xfrm>
-          <a:off x="0" y="0"/>
-          <a:ext cx="0" cy="0"/>
-          <a:chOff x="0" y="0"/>
-          <a:chExt cx="0" cy="0"/>
-        </a:xfrm>
-      </p:grpSpPr>
-      <p:sp>
-        <p:nvSpPr>
-          <p:cNvPr id="204" name="Google Shape;204;ga8aa0623b4_3_51"/>
-          <p:cNvSpPr txBox="1"/>
-          <p:nvPr>
-            <p:ph type="title"/>
-          </p:nvPr>
-        </p:nvSpPr>
-        <p:spPr>
-          <a:xfrm>
-            <a:off x="2231136" y="964692"/>
-            <a:ext cx="7729800" cy="1188600"/>
-          </a:xfrm>
-          <a:prstGeom prst="rect">
-            <a:avLst/>
-          </a:prstGeom>
-          <a:solidFill>
-            <a:schemeClr val="lt1"/>
-          </a:solidFill>
-          <a:ln cap="sq" cmpd="sng" w="31750">
-            <a:solidFill>
-              <a:srgbClr val="3F3F3F"/>
-            </a:solidFill>
-            <a:prstDash val="solid"/>
-            <a:miter lim="800000"/>
-            <a:headEnd len="sm" w="sm" type="none"/>
-            <a:tailEnd len="sm" w="sm" type="none"/>
-          </a:ln>
-        </p:spPr>
-        <p:txBody>
-          <a:bodyPr anchorCtr="0" anchor="ctr" bIns="182875" lIns="182875" spcFirstLastPara="1" rIns="182875" wrap="square" tIns="182875">
-            <a:noAutofit/>
-          </a:bodyPr>
-          <a:lstStyle/>
-          <a:p>
-            <a:pPr indent="0" lvl="0" marL="0" rtl="0" algn="ctr">
-              <a:lnSpc>
-                <a:spcPct val="90000"/>
-              </a:lnSpc>
-              <a:spcBef>
-                <a:spcPts val="0"/>
-              </a:spcBef>
-              <a:spcAft>
-                <a:spcPts val="0"/>
-              </a:spcAft>
-              <a:buSzPts val="1800"/>
-              <a:buNone/>
-            </a:pPr>
-            <a:r>
-              <a:rPr lang="en-IN"/>
-              <a:t>SKIP &amp; LIMIT</a:t>
-            </a:r>
-            <a:endParaRPr/>
-          </a:p>
-        </p:txBody>
-      </p:sp>
-      <p:sp>
-        <p:nvSpPr>
-          <p:cNvPr id="205" name="Google Shape;205;ga8aa0623b4_3_51"/>
-          <p:cNvSpPr txBox="1"/>
-          <p:nvPr>
-            <p:ph idx="1" type="body"/>
-          </p:nvPr>
-        </p:nvSpPr>
-        <p:spPr>
-          <a:xfrm>
-            <a:off x="995525" y="2475875"/>
-            <a:ext cx="5021700" cy="3704100"/>
-          </a:xfrm>
-          <a:prstGeom prst="rect">
-            <a:avLst/>
-          </a:prstGeom>
-          <a:noFill/>
-          <a:ln>
-            <a:noFill/>
-          </a:ln>
-        </p:spPr>
-        <p:txBody>
-          <a:bodyPr anchorCtr="0" anchor="t" bIns="45700" lIns="91425" spcFirstLastPara="1" rIns="91425" wrap="square" tIns="45700">
-            <a:noAutofit/>
-          </a:bodyPr>
-          <a:lstStyle/>
-          <a:p>
-            <a:pPr indent="0" lvl="0" marL="0" rtl="0" algn="l">
-              <a:lnSpc>
-                <a:spcPct val="100000"/>
-              </a:lnSpc>
-              <a:spcBef>
-                <a:spcPts val="1000"/>
-              </a:spcBef>
-              <a:spcAft>
-                <a:spcPts val="0"/>
-              </a:spcAft>
-              <a:buClr>
-                <a:schemeClr val="dk1"/>
-              </a:buClr>
-              <a:buSzPts val="1100"/>
-              <a:buFont typeface="Arial"/>
-              <a:buNone/>
-            </a:pPr>
-            <a:r>
-              <a:rPr lang="en-IN"/>
-              <a:t>The Limit() Method</a:t>
-            </a:r>
-            <a:endParaRPr/>
-          </a:p>
-          <a:p>
-            <a:pPr indent="0" lvl="0" marL="0" rtl="0" algn="l">
-              <a:lnSpc>
-                <a:spcPct val="100000"/>
-              </a:lnSpc>
-              <a:spcBef>
-                <a:spcPts val="1000"/>
-              </a:spcBef>
-              <a:spcAft>
-                <a:spcPts val="0"/>
-              </a:spcAft>
-              <a:buClr>
-                <a:schemeClr val="dk1"/>
-              </a:buClr>
-              <a:buSzPts val="1100"/>
-              <a:buFont typeface="Arial"/>
-              <a:buNone/>
-            </a:pPr>
-            <a:r>
-              <a:rPr lang="en-IN"/>
-              <a:t>To limit the records in MongoDB, you need to use limit() method. The method accepts one number type argument, which is the number of documents that you want to be displayed.</a:t>
-            </a:r>
-            <a:endParaRPr/>
-          </a:p>
-          <a:p>
-            <a:pPr indent="0" lvl="0" marL="0" rtl="0" algn="l">
-              <a:lnSpc>
-                <a:spcPct val="100000"/>
-              </a:lnSpc>
-              <a:spcBef>
-                <a:spcPts val="1000"/>
-              </a:spcBef>
-              <a:spcAft>
-                <a:spcPts val="0"/>
-              </a:spcAft>
-              <a:buSzPts val="1800"/>
-              <a:buNone/>
-            </a:pPr>
-            <a:r>
-              <a:rPr lang="en-IN"/>
-              <a:t>The basic syntax of limit() method is as follows −</a:t>
-            </a:r>
-            <a:endParaRPr/>
-          </a:p>
-          <a:p>
-            <a:pPr indent="0" lvl="0" marL="0" rtl="0" algn="l">
-              <a:lnSpc>
-                <a:spcPct val="100000"/>
-              </a:lnSpc>
-              <a:spcBef>
-                <a:spcPts val="1000"/>
-              </a:spcBef>
-              <a:spcAft>
-                <a:spcPts val="0"/>
-              </a:spcAft>
-              <a:buSzPts val="1800"/>
-              <a:buNone/>
-            </a:pPr>
-            <a:r>
-              <a:rPr lang="en-IN"/>
-              <a:t>&gt; db.COLLECTION_NAME.find().limit(NUMBER)</a:t>
-            </a:r>
-            <a:endParaRPr/>
-          </a:p>
-          <a:p>
-            <a:pPr indent="0" lvl="0" marL="0" rtl="0" algn="l">
-              <a:lnSpc>
-                <a:spcPct val="100000"/>
-              </a:lnSpc>
-              <a:spcBef>
-                <a:spcPts val="1000"/>
-              </a:spcBef>
-              <a:spcAft>
-                <a:spcPts val="0"/>
-              </a:spcAft>
-              <a:buSzPts val="1800"/>
-              <a:buNone/>
-            </a:pPr>
-            <a:r>
-              <a:rPr lang="en-IN"/>
-              <a:t>&gt; db.mycol.find({},{"title":1,_id:0}).limit(2)</a:t>
-            </a:r>
-            <a:endParaRPr/>
-          </a:p>
-          <a:p>
-            <a:pPr indent="0" lvl="0" marL="0" rtl="0" algn="l">
-              <a:lnSpc>
-                <a:spcPct val="100000"/>
-              </a:lnSpc>
-              <a:spcBef>
-                <a:spcPts val="1000"/>
-              </a:spcBef>
-              <a:spcAft>
-                <a:spcPts val="0"/>
-              </a:spcAft>
-              <a:buSzPts val="1800"/>
-              <a:buNone/>
-            </a:pPr>
-            <a:r>
-              <a:rPr lang="en-IN" sz="1500"/>
-              <a:t>If you don't specify the number argument in limit() method then it will display all documents from the collection.</a:t>
-            </a:r>
-            <a:endParaRPr sz="1500"/>
-          </a:p>
-        </p:txBody>
-      </p:sp>
-      <p:sp>
-        <p:nvSpPr>
-          <p:cNvPr id="206" name="Google Shape;206;ga8aa0623b4_3_51"/>
-          <p:cNvSpPr txBox="1"/>
-          <p:nvPr>
-            <p:ph idx="1" type="body"/>
-          </p:nvPr>
-        </p:nvSpPr>
-        <p:spPr>
-          <a:xfrm>
-            <a:off x="6495775" y="2475875"/>
-            <a:ext cx="5021700" cy="3704100"/>
-          </a:xfrm>
-          <a:prstGeom prst="rect">
-            <a:avLst/>
-          </a:prstGeom>
-          <a:noFill/>
-          <a:ln>
-            <a:noFill/>
-          </a:ln>
-        </p:spPr>
-        <p:txBody>
-          <a:bodyPr anchorCtr="0" anchor="t" bIns="45700" lIns="91425" spcFirstLastPara="1" rIns="91425" wrap="square" tIns="45700">
-            <a:noAutofit/>
-          </a:bodyPr>
-          <a:lstStyle/>
-          <a:p>
-            <a:pPr indent="0" lvl="0" marL="0" rtl="0" algn="l">
-              <a:lnSpc>
-                <a:spcPct val="100000"/>
-              </a:lnSpc>
-              <a:spcBef>
-                <a:spcPts val="1000"/>
-              </a:spcBef>
-              <a:spcAft>
-                <a:spcPts val="0"/>
-              </a:spcAft>
-              <a:buClr>
-                <a:schemeClr val="dk1"/>
-              </a:buClr>
-              <a:buSzPts val="1100"/>
-              <a:buFont typeface="Arial"/>
-              <a:buNone/>
-            </a:pPr>
-            <a:r>
-              <a:rPr lang="en-IN"/>
-              <a:t>MongoDB Skip() Method</a:t>
-            </a:r>
-            <a:endParaRPr/>
-          </a:p>
-          <a:p>
-            <a:pPr indent="0" lvl="0" marL="0" rtl="0" algn="l">
-              <a:lnSpc>
-                <a:spcPct val="100000"/>
-              </a:lnSpc>
-              <a:spcBef>
-                <a:spcPts val="1000"/>
-              </a:spcBef>
-              <a:spcAft>
-                <a:spcPts val="0"/>
-              </a:spcAft>
-              <a:buClr>
-                <a:schemeClr val="dk1"/>
-              </a:buClr>
-              <a:buSzPts val="1100"/>
-              <a:buFont typeface="Arial"/>
-              <a:buNone/>
-            </a:pPr>
-            <a:r>
-              <a:rPr lang="en-IN"/>
-              <a:t>Apart from limit() method, there is one more method skip() which also accepts number type argument and is used to skip the number of documents.</a:t>
-            </a:r>
-            <a:endParaRPr/>
-          </a:p>
-          <a:p>
-            <a:pPr indent="0" lvl="0" marL="0" rtl="0" algn="l">
-              <a:lnSpc>
-                <a:spcPct val="100000"/>
-              </a:lnSpc>
-              <a:spcBef>
-                <a:spcPts val="1000"/>
-              </a:spcBef>
-              <a:spcAft>
-                <a:spcPts val="0"/>
-              </a:spcAft>
-              <a:buClr>
-                <a:schemeClr val="dk1"/>
-              </a:buClr>
-              <a:buSzPts val="1100"/>
-              <a:buFont typeface="Arial"/>
-              <a:buNone/>
-            </a:pPr>
-            <a:r>
-              <a:rPr lang="en-IN"/>
-              <a:t>The basic syntax of skip() method is as follows −</a:t>
-            </a:r>
-            <a:endParaRPr/>
-          </a:p>
-          <a:p>
-            <a:pPr indent="0" lvl="0" marL="0" rtl="0" algn="l">
-              <a:lnSpc>
-                <a:spcPct val="100000"/>
-              </a:lnSpc>
-              <a:spcBef>
-                <a:spcPts val="1000"/>
-              </a:spcBef>
-              <a:spcAft>
-                <a:spcPts val="0"/>
-              </a:spcAft>
-              <a:buSzPts val="1800"/>
-              <a:buNone/>
-            </a:pPr>
-            <a:r>
-              <a:rPr lang="en-IN"/>
-              <a:t>&gt;db.COLLECTION_NAME.find().limit(NUMBER).skip(NUMBER)</a:t>
-            </a:r>
-            <a:endParaRPr/>
-          </a:p>
-          <a:p>
-            <a:pPr indent="0" lvl="0" marL="0" rtl="0" algn="l">
-              <a:lnSpc>
-                <a:spcPct val="100000"/>
-              </a:lnSpc>
-              <a:spcBef>
-                <a:spcPts val="1000"/>
-              </a:spcBef>
-              <a:spcAft>
-                <a:spcPts val="0"/>
-              </a:spcAft>
-              <a:buClr>
-                <a:schemeClr val="dk1"/>
-              </a:buClr>
-              <a:buSzPts val="1100"/>
-              <a:buFont typeface="Arial"/>
-              <a:buNone/>
-            </a:pPr>
-            <a:r>
-              <a:rPr lang="en-IN"/>
-              <a:t>&gt;db.mycol.find({},{"title":1,_id:0}).limit(1).skip(1)</a:t>
-            </a:r>
-            <a:endParaRPr/>
-          </a:p>
-          <a:p>
-            <a:pPr indent="0" lvl="0" marL="0" rtl="0" algn="l">
-              <a:lnSpc>
-                <a:spcPct val="100000"/>
-              </a:lnSpc>
-              <a:spcBef>
-                <a:spcPts val="1000"/>
-              </a:spcBef>
-              <a:spcAft>
-                <a:spcPts val="0"/>
-              </a:spcAft>
-              <a:buSzPts val="1800"/>
-              <a:buNone/>
-            </a:pPr>
-            <a:r>
-              <a:t/>
-            </a:r>
-            <a:endParaRPr/>
-          </a:p>
-        </p:txBody>
-      </p:sp>
     </p:spTree>
   </p:cSld>
   <p:clrMapOvr>
@@ -24186,6 +23640,285 @@
 </file>
 
 <file path=ppt/theme/theme2.xml><?xml version="1.0" encoding="utf-8"?>
+<a:theme xmlns:a="http://schemas.openxmlformats.org/drawingml/2006/main" xmlns:r="http://schemas.openxmlformats.org/officeDocument/2006/relationships" name="Office Theme">
+  <a:themeElements>
+    <a:clrScheme name="Office">
+      <a:dk1>
+        <a:srgbClr val="000000"/>
+      </a:dk1>
+      <a:lt1>
+        <a:srgbClr val="FFFFFF"/>
+      </a:lt1>
+      <a:dk2>
+        <a:srgbClr val="44546A"/>
+      </a:dk2>
+      <a:lt2>
+        <a:srgbClr val="E7E6E6"/>
+      </a:lt2>
+      <a:accent1>
+        <a:srgbClr val="4472C4"/>
+      </a:accent1>
+      <a:accent2>
+        <a:srgbClr val="ED7D31"/>
+      </a:accent2>
+      <a:accent3>
+        <a:srgbClr val="A5A5A5"/>
+      </a:accent3>
+      <a:accent4>
+        <a:srgbClr val="FFC000"/>
+      </a:accent4>
+      <a:accent5>
+        <a:srgbClr val="5B9BD5"/>
+      </a:accent5>
+      <a:accent6>
+        <a:srgbClr val="70AD47"/>
+      </a:accent6>
+      <a:hlink>
+        <a:srgbClr val="0563C1"/>
+      </a:hlink>
+      <a:folHlink>
+        <a:srgbClr val="954F72"/>
+      </a:folHlink>
+    </a:clrScheme>
+    <a:fontScheme name="Office">
+      <a:majorFont>
+        <a:latin typeface="Arial"/>
+        <a:ea typeface=""/>
+        <a:cs typeface=""/>
+        <a:font script="Jpan" typeface="ＭＳ Ｐゴシック"/>
+        <a:font script="Hang" typeface="맑은 고딕"/>
+        <a:font script="Hans" typeface="宋体"/>
+        <a:font script="Hant" typeface="新細明體"/>
+        <a:font script="Arab" typeface="Times New Roman"/>
+        <a:font script="Hebr" typeface="Times New Roman"/>
+        <a:font script="Thai" typeface="Angsana New"/>
+        <a:font script="Ethi" typeface="Nyala"/>
+        <a:font script="Beng" typeface="Vrinda"/>
+        <a:font script="Gujr" typeface="Shruti"/>
+        <a:font script="Khmr" typeface="MoolBoran"/>
+        <a:font script="Knda" typeface="Tunga"/>
+        <a:font script="Guru" typeface="Raavi"/>
+        <a:font script="Cans" typeface="Euphemia"/>
+        <a:font script="Cher" typeface="Plantagenet Cherokee"/>
+        <a:font script="Yiii" typeface="Microsoft Yi Baiti"/>
+        <a:font script="Tibt" typeface="Microsoft Himalaya"/>
+        <a:font script="Thaa" typeface="MV Boli"/>
+        <a:font script="Deva" typeface="Mangal"/>
+        <a:font script="Telu" typeface="Gautami"/>
+        <a:font script="Taml" typeface="Latha"/>
+        <a:font script="Syrc" typeface="Estrangelo Edessa"/>
+        <a:font script="Orya" typeface="Kalinga"/>
+        <a:font script="Mlym" typeface="Kartika"/>
+        <a:font script="Laoo" typeface="DokChampa"/>
+        <a:font script="Sinh" typeface="Iskoola Pota"/>
+        <a:font script="Mong" typeface="Mongolian Baiti"/>
+        <a:font script="Viet" typeface="Times New Roman"/>
+        <a:font script="Uigh" typeface="Microsoft Uighur"/>
+        <a:font script="Geor" typeface="Sylfaen"/>
+      </a:majorFont>
+      <a:minorFont>
+        <a:latin typeface="Arial"/>
+        <a:ea typeface=""/>
+        <a:cs typeface=""/>
+        <a:font script="Jpan" typeface="ＭＳ Ｐゴシック"/>
+        <a:font script="Hang" typeface="맑은 고딕"/>
+        <a:font script="Hans" typeface="宋体"/>
+        <a:font script="Hant" typeface="新細明體"/>
+        <a:font script="Arab" typeface="Arial"/>
+        <a:font script="Hebr" typeface="Arial"/>
+        <a:font script="Thai" typeface="Cordia New"/>
+        <a:font script="Ethi" typeface="Nyala"/>
+        <a:font script="Beng" typeface="Vrinda"/>
+        <a:font script="Gujr" typeface="Shruti"/>
+        <a:font script="Khmr" typeface="DaunPenh"/>
+        <a:font script="Knda" typeface="Tunga"/>
+        <a:font script="Guru" typeface="Raavi"/>
+        <a:font script="Cans" typeface="Euphemia"/>
+        <a:font script="Cher" typeface="Plantagenet Cherokee"/>
+        <a:font script="Yiii" typeface="Microsoft Yi Baiti"/>
+        <a:font script="Tibt" typeface="Microsoft Himalaya"/>
+        <a:font script="Thaa" typeface="MV Boli"/>
+        <a:font script="Deva" typeface="Mangal"/>
+        <a:font script="Telu" typeface="Gautami"/>
+        <a:font script="Taml" typeface="Latha"/>
+        <a:font script="Syrc" typeface="Estrangelo Edessa"/>
+        <a:font script="Orya" typeface="Kalinga"/>
+        <a:font script="Mlym" typeface="Kartika"/>
+        <a:font script="Laoo" typeface="DokChampa"/>
+        <a:font script="Sinh" typeface="Iskoola Pota"/>
+        <a:font script="Mong" typeface="Mongolian Baiti"/>
+        <a:font script="Viet" typeface="Arial"/>
+        <a:font script="Uigh" typeface="Microsoft Uighur"/>
+        <a:font script="Geor" typeface="Sylfaen"/>
+      </a:minorFont>
+    </a:fontScheme>
+    <a:fmtScheme name="Office">
+      <a:fillStyleLst>
+        <a:solidFill>
+          <a:schemeClr val="phClr"/>
+        </a:solidFill>
+        <a:gradFill rotWithShape="1">
+          <a:gsLst>
+            <a:gs pos="0">
+              <a:schemeClr val="phClr">
+                <a:tint val="50000"/>
+                <a:satMod val="300000"/>
+              </a:schemeClr>
+            </a:gs>
+            <a:gs pos="35000">
+              <a:schemeClr val="phClr">
+                <a:tint val="37000"/>
+                <a:satMod val="300000"/>
+              </a:schemeClr>
+            </a:gs>
+            <a:gs pos="100000">
+              <a:schemeClr val="phClr">
+                <a:tint val="15000"/>
+                <a:satMod val="350000"/>
+              </a:schemeClr>
+            </a:gs>
+          </a:gsLst>
+          <a:lin ang="16200000" scaled="1"/>
+        </a:gradFill>
+        <a:gradFill rotWithShape="1">
+          <a:gsLst>
+            <a:gs pos="0">
+              <a:schemeClr val="phClr">
+                <a:tint val="100000"/>
+                <a:shade val="100000"/>
+                <a:satMod val="130000"/>
+              </a:schemeClr>
+            </a:gs>
+            <a:gs pos="100000">
+              <a:schemeClr val="phClr">
+                <a:tint val="50000"/>
+                <a:shade val="100000"/>
+                <a:satMod val="350000"/>
+              </a:schemeClr>
+            </a:gs>
+          </a:gsLst>
+          <a:lin ang="16200000" scaled="0"/>
+        </a:gradFill>
+      </a:fillStyleLst>
+      <a:lnStyleLst>
+        <a:ln w="9525" cap="flat" cmpd="sng" algn="ctr">
+          <a:solidFill>
+            <a:schemeClr val="phClr">
+              <a:shade val="95000"/>
+              <a:satMod val="105000"/>
+            </a:schemeClr>
+          </a:solidFill>
+          <a:prstDash val="solid"/>
+        </a:ln>
+        <a:ln w="25400" cap="flat" cmpd="sng" algn="ctr">
+          <a:solidFill>
+            <a:schemeClr val="phClr"/>
+          </a:solidFill>
+          <a:prstDash val="solid"/>
+        </a:ln>
+        <a:ln w="38100" cap="flat" cmpd="sng" algn="ctr">
+          <a:solidFill>
+            <a:schemeClr val="phClr"/>
+          </a:solidFill>
+          <a:prstDash val="solid"/>
+        </a:ln>
+      </a:lnStyleLst>
+      <a:effectStyleLst>
+        <a:effectStyle>
+          <a:effectLst>
+            <a:outerShdw blurRad="40000" dist="20000" dir="5400000" rotWithShape="0">
+              <a:srgbClr val="000000">
+                <a:alpha val="38000"/>
+              </a:srgbClr>
+            </a:outerShdw>
+          </a:effectLst>
+        </a:effectStyle>
+        <a:effectStyle>
+          <a:effectLst>
+            <a:outerShdw blurRad="40000" dist="23000" dir="5400000" rotWithShape="0">
+              <a:srgbClr val="000000">
+                <a:alpha val="35000"/>
+              </a:srgbClr>
+            </a:outerShdw>
+          </a:effectLst>
+        </a:effectStyle>
+        <a:effectStyle>
+          <a:effectLst>
+            <a:outerShdw blurRad="40000" dist="23000" dir="5400000" rotWithShape="0">
+              <a:srgbClr val="000000">
+                <a:alpha val="35000"/>
+              </a:srgbClr>
+            </a:outerShdw>
+          </a:effectLst>
+          <a:scene3d>
+            <a:camera prst="orthographicFront">
+              <a:rot lat="0" lon="0" rev="0"/>
+            </a:camera>
+            <a:lightRig rig="threePt" dir="t">
+              <a:rot lat="0" lon="0" rev="1200000"/>
+            </a:lightRig>
+          </a:scene3d>
+          <a:sp3d>
+            <a:bevelT w="63500" h="25400"/>
+          </a:sp3d>
+        </a:effectStyle>
+      </a:effectStyleLst>
+      <a:bgFillStyleLst>
+        <a:solidFill>
+          <a:schemeClr val="phClr"/>
+        </a:solidFill>
+        <a:gradFill rotWithShape="1">
+          <a:gsLst>
+            <a:gs pos="0">
+              <a:schemeClr val="phClr">
+                <a:tint val="40000"/>
+                <a:satMod val="350000"/>
+              </a:schemeClr>
+            </a:gs>
+            <a:gs pos="40000">
+              <a:schemeClr val="phClr">
+                <a:tint val="45000"/>
+                <a:shade val="99000"/>
+                <a:satMod val="350000"/>
+              </a:schemeClr>
+            </a:gs>
+            <a:gs pos="100000">
+              <a:schemeClr val="phClr">
+                <a:shade val="20000"/>
+                <a:satMod val="255000"/>
+              </a:schemeClr>
+            </a:gs>
+          </a:gsLst>
+          <a:path path="circle">
+            <a:fillToRect l="50000" t="-80000" r="50000" b="180000"/>
+          </a:path>
+        </a:gradFill>
+        <a:gradFill rotWithShape="1">
+          <a:gsLst>
+            <a:gs pos="0">
+              <a:schemeClr val="phClr">
+                <a:tint val="80000"/>
+                <a:satMod val="300000"/>
+              </a:schemeClr>
+            </a:gs>
+            <a:gs pos="100000">
+              <a:schemeClr val="phClr">
+                <a:shade val="30000"/>
+                <a:satMod val="200000"/>
+              </a:schemeClr>
+            </a:gs>
+          </a:gsLst>
+          <a:path path="circle">
+            <a:fillToRect l="50000" t="50000" r="50000" b="50000"/>
+          </a:path>
+        </a:gradFill>
+      </a:bgFillStyleLst>
+    </a:fmtScheme>
+  </a:themeElements>
+</a:theme>
+</file>
+
+<file path=ppt/theme/theme3.xml><?xml version="1.0" encoding="utf-8"?>
 <a:theme xmlns:a="http://schemas.openxmlformats.org/drawingml/2006/main" xmlns:r="http://schemas.openxmlformats.org/officeDocument/2006/relationships" name="Parcel">
   <a:themeElements>
     <a:clrScheme name="Parcel">
@@ -24462,283 +24195,4 @@
     </a:fmtScheme>
   </a:themeElements>
 </a:theme>
-</file>
-
-<file path=ppt/theme/theme3.xml><?xml version="1.0" encoding="utf-8"?>
-<a:theme xmlns:a="http://schemas.openxmlformats.org/drawingml/2006/main" xmlns:r="http://schemas.openxmlformats.org/officeDocument/2006/relationships" name="Office Theme">
-  <a:themeElements>
-    <a:clrScheme name="Office">
-      <a:dk1>
-        <a:srgbClr val="000000"/>
-      </a:dk1>
-      <a:lt1>
-        <a:srgbClr val="FFFFFF"/>
-      </a:lt1>
-      <a:dk2>
-        <a:srgbClr val="44546A"/>
-      </a:dk2>
-      <a:lt2>
-        <a:srgbClr val="E7E6E6"/>
-      </a:lt2>
-      <a:accent1>
-        <a:srgbClr val="4472C4"/>
-      </a:accent1>
-      <a:accent2>
-        <a:srgbClr val="ED7D31"/>
-      </a:accent2>
-      <a:accent3>
-        <a:srgbClr val="A5A5A5"/>
-      </a:accent3>
-      <a:accent4>
-        <a:srgbClr val="FFC000"/>
-      </a:accent4>
-      <a:accent5>
-        <a:srgbClr val="5B9BD5"/>
-      </a:accent5>
-      <a:accent6>
-        <a:srgbClr val="70AD47"/>
-      </a:accent6>
-      <a:hlink>
-        <a:srgbClr val="0563C1"/>
-      </a:hlink>
-      <a:folHlink>
-        <a:srgbClr val="954F72"/>
-      </a:folHlink>
-    </a:clrScheme>
-    <a:fontScheme name="Office">
-      <a:majorFont>
-        <a:latin typeface="Arial"/>
-        <a:ea typeface=""/>
-        <a:cs typeface=""/>
-        <a:font script="Jpan" typeface="ＭＳ Ｐゴシック"/>
-        <a:font script="Hang" typeface="맑은 고딕"/>
-        <a:font script="Hans" typeface="宋体"/>
-        <a:font script="Hant" typeface="新細明體"/>
-        <a:font script="Arab" typeface="Times New Roman"/>
-        <a:font script="Hebr" typeface="Times New Roman"/>
-        <a:font script="Thai" typeface="Angsana New"/>
-        <a:font script="Ethi" typeface="Nyala"/>
-        <a:font script="Beng" typeface="Vrinda"/>
-        <a:font script="Gujr" typeface="Shruti"/>
-        <a:font script="Khmr" typeface="MoolBoran"/>
-        <a:font script="Knda" typeface="Tunga"/>
-        <a:font script="Guru" typeface="Raavi"/>
-        <a:font script="Cans" typeface="Euphemia"/>
-        <a:font script="Cher" typeface="Plantagenet Cherokee"/>
-        <a:font script="Yiii" typeface="Microsoft Yi Baiti"/>
-        <a:font script="Tibt" typeface="Microsoft Himalaya"/>
-        <a:font script="Thaa" typeface="MV Boli"/>
-        <a:font script="Deva" typeface="Mangal"/>
-        <a:font script="Telu" typeface="Gautami"/>
-        <a:font script="Taml" typeface="Latha"/>
-        <a:font script="Syrc" typeface="Estrangelo Edessa"/>
-        <a:font script="Orya" typeface="Kalinga"/>
-        <a:font script="Mlym" typeface="Kartika"/>
-        <a:font script="Laoo" typeface="DokChampa"/>
-        <a:font script="Sinh" typeface="Iskoola Pota"/>
-        <a:font script="Mong" typeface="Mongolian Baiti"/>
-        <a:font script="Viet" typeface="Times New Roman"/>
-        <a:font script="Uigh" typeface="Microsoft Uighur"/>
-        <a:font script="Geor" typeface="Sylfaen"/>
-      </a:majorFont>
-      <a:minorFont>
-        <a:latin typeface="Arial"/>
-        <a:ea typeface=""/>
-        <a:cs typeface=""/>
-        <a:font script="Jpan" typeface="ＭＳ Ｐゴシック"/>
-        <a:font script="Hang" typeface="맑은 고딕"/>
-        <a:font script="Hans" typeface="宋体"/>
-        <a:font script="Hant" typeface="新細明體"/>
-        <a:font script="Arab" typeface="Arial"/>
-        <a:font script="Hebr" typeface="Arial"/>
-        <a:font script="Thai" typeface="Cordia New"/>
-        <a:font script="Ethi" typeface="Nyala"/>
-        <a:font script="Beng" typeface="Vrinda"/>
-        <a:font script="Gujr" typeface="Shruti"/>
-        <a:font script="Khmr" typeface="DaunPenh"/>
-        <a:font script="Knda" typeface="Tunga"/>
-        <a:font script="Guru" typeface="Raavi"/>
-        <a:font script="Cans" typeface="Euphemia"/>
-        <a:font script="Cher" typeface="Plantagenet Cherokee"/>
-        <a:font script="Yiii" typeface="Microsoft Yi Baiti"/>
-        <a:font script="Tibt" typeface="Microsoft Himalaya"/>
-        <a:font script="Thaa" typeface="MV Boli"/>
-        <a:font script="Deva" typeface="Mangal"/>
-        <a:font script="Telu" typeface="Gautami"/>
-        <a:font script="Taml" typeface="Latha"/>
-        <a:font script="Syrc" typeface="Estrangelo Edessa"/>
-        <a:font script="Orya" typeface="Kalinga"/>
-        <a:font script="Mlym" typeface="Kartika"/>
-        <a:font script="Laoo" typeface="DokChampa"/>
-        <a:font script="Sinh" typeface="Iskoola Pota"/>
-        <a:font script="Mong" typeface="Mongolian Baiti"/>
-        <a:font script="Viet" typeface="Arial"/>
-        <a:font script="Uigh" typeface="Microsoft Uighur"/>
-        <a:font script="Geor" typeface="Sylfaen"/>
-      </a:minorFont>
-    </a:fontScheme>
-    <a:fmtScheme name="Office">
-      <a:fillStyleLst>
-        <a:solidFill>
-          <a:schemeClr val="phClr"/>
-        </a:solidFill>
-        <a:gradFill rotWithShape="1">
-          <a:gsLst>
-            <a:gs pos="0">
-              <a:schemeClr val="phClr">
-                <a:tint val="50000"/>
-                <a:satMod val="300000"/>
-              </a:schemeClr>
-            </a:gs>
-            <a:gs pos="35000">
-              <a:schemeClr val="phClr">
-                <a:tint val="37000"/>
-                <a:satMod val="300000"/>
-              </a:schemeClr>
-            </a:gs>
-            <a:gs pos="100000">
-              <a:schemeClr val="phClr">
-                <a:tint val="15000"/>
-                <a:satMod val="350000"/>
-              </a:schemeClr>
-            </a:gs>
-          </a:gsLst>
-          <a:lin ang="16200000" scaled="1"/>
-        </a:gradFill>
-        <a:gradFill rotWithShape="1">
-          <a:gsLst>
-            <a:gs pos="0">
-              <a:schemeClr val="phClr">
-                <a:tint val="100000"/>
-                <a:shade val="100000"/>
-                <a:satMod val="130000"/>
-              </a:schemeClr>
-            </a:gs>
-            <a:gs pos="100000">
-              <a:schemeClr val="phClr">
-                <a:tint val="50000"/>
-                <a:shade val="100000"/>
-                <a:satMod val="350000"/>
-              </a:schemeClr>
-            </a:gs>
-          </a:gsLst>
-          <a:lin ang="16200000" scaled="0"/>
-        </a:gradFill>
-      </a:fillStyleLst>
-      <a:lnStyleLst>
-        <a:ln w="9525" cap="flat" cmpd="sng" algn="ctr">
-          <a:solidFill>
-            <a:schemeClr val="phClr">
-              <a:shade val="95000"/>
-              <a:satMod val="105000"/>
-            </a:schemeClr>
-          </a:solidFill>
-          <a:prstDash val="solid"/>
-        </a:ln>
-        <a:ln w="25400" cap="flat" cmpd="sng" algn="ctr">
-          <a:solidFill>
-            <a:schemeClr val="phClr"/>
-          </a:solidFill>
-          <a:prstDash val="solid"/>
-        </a:ln>
-        <a:ln w="38100" cap="flat" cmpd="sng" algn="ctr">
-          <a:solidFill>
-            <a:schemeClr val="phClr"/>
-          </a:solidFill>
-          <a:prstDash val="solid"/>
-        </a:ln>
-      </a:lnStyleLst>
-      <a:effectStyleLst>
-        <a:effectStyle>
-          <a:effectLst>
-            <a:outerShdw blurRad="40000" dist="20000" dir="5400000" rotWithShape="0">
-              <a:srgbClr val="000000">
-                <a:alpha val="38000"/>
-              </a:srgbClr>
-            </a:outerShdw>
-          </a:effectLst>
-        </a:effectStyle>
-        <a:effectStyle>
-          <a:effectLst>
-            <a:outerShdw blurRad="40000" dist="23000" dir="5400000" rotWithShape="0">
-              <a:srgbClr val="000000">
-                <a:alpha val="35000"/>
-              </a:srgbClr>
-            </a:outerShdw>
-          </a:effectLst>
-        </a:effectStyle>
-        <a:effectStyle>
-          <a:effectLst>
-            <a:outerShdw blurRad="40000" dist="23000" dir="5400000" rotWithShape="0">
-              <a:srgbClr val="000000">
-                <a:alpha val="35000"/>
-              </a:srgbClr>
-            </a:outerShdw>
-          </a:effectLst>
-          <a:scene3d>
-            <a:camera prst="orthographicFront">
-              <a:rot lat="0" lon="0" rev="0"/>
-            </a:camera>
-            <a:lightRig rig="threePt" dir="t">
-              <a:rot lat="0" lon="0" rev="1200000"/>
-            </a:lightRig>
-          </a:scene3d>
-          <a:sp3d>
-            <a:bevelT w="63500" h="25400"/>
-          </a:sp3d>
-        </a:effectStyle>
-      </a:effectStyleLst>
-      <a:bgFillStyleLst>
-        <a:solidFill>
-          <a:schemeClr val="phClr"/>
-        </a:solidFill>
-        <a:gradFill rotWithShape="1">
-          <a:gsLst>
-            <a:gs pos="0">
-              <a:schemeClr val="phClr">
-                <a:tint val="40000"/>
-                <a:satMod val="350000"/>
-              </a:schemeClr>
-            </a:gs>
-            <a:gs pos="40000">
-              <a:schemeClr val="phClr">
-                <a:tint val="45000"/>
-                <a:shade val="99000"/>
-                <a:satMod val="350000"/>
-              </a:schemeClr>
-            </a:gs>
-            <a:gs pos="100000">
-              <a:schemeClr val="phClr">
-                <a:shade val="20000"/>
-                <a:satMod val="255000"/>
-              </a:schemeClr>
-            </a:gs>
-          </a:gsLst>
-          <a:path path="circle">
-            <a:fillToRect l="50000" t="-80000" r="50000" b="180000"/>
-          </a:path>
-        </a:gradFill>
-        <a:gradFill rotWithShape="1">
-          <a:gsLst>
-            <a:gs pos="0">
-              <a:schemeClr val="phClr">
-                <a:tint val="80000"/>
-                <a:satMod val="300000"/>
-              </a:schemeClr>
-            </a:gs>
-            <a:gs pos="100000">
-              <a:schemeClr val="phClr">
-                <a:shade val="30000"/>
-                <a:satMod val="200000"/>
-              </a:schemeClr>
-            </a:gs>
-          </a:gsLst>
-          <a:path path="circle">
-            <a:fillToRect l="50000" t="50000" r="50000" b="50000"/>
-          </a:path>
-        </a:gradFill>
-      </a:bgFillStyleLst>
-    </a:fmtScheme>
-  </a:themeElements>
-</a:theme>
 </file>
</xml_diff>